<commit_message>
Fixed DH in presentation
</commit_message>
<xml_diff>
--- a/docs/Armadill.pptx
+++ b/docs/Armadill.pptx
@@ -201,7 +201,7 @@
           <a:p>
             <a:fld id="{4DDD94FB-82BA-4CC4-A95D-7BDB46DFBBA3}" type="datetimeFigureOut">
               <a:rPr lang="cs-CZ" smtClean="0"/>
-              <a:t>13. 3. 2016</a:t>
+              <a:t>14. 3. 2016</a:t>
             </a:fld>
             <a:endParaRPr lang="cs-CZ"/>
           </a:p>
@@ -823,7 +823,7 @@
           <a:p>
             <a:fld id="{4AAD347D-5ACD-4C99-B74B-A9C85AD731AF}" type="datetimeFigureOut">
               <a:rPr lang="en-US" smtClean="0"/>
-              <a:t>3/13/2016</a:t>
+              <a:t>3/14/2016</a:t>
             </a:fld>
             <a:endParaRPr lang="en-US" dirty="0"/>
           </a:p>
@@ -1098,7 +1098,7 @@
           <a:p>
             <a:fld id="{4509A250-FF31-4206-8172-F9D3106AACB1}" type="datetimeFigureOut">
               <a:rPr lang="en-US" smtClean="0"/>
-              <a:t>3/13/2016</a:t>
+              <a:t>3/14/2016</a:t>
             </a:fld>
             <a:endParaRPr lang="en-US" dirty="0"/>
           </a:p>
@@ -1292,7 +1292,7 @@
           <a:p>
             <a:fld id="{4509A250-FF31-4206-8172-F9D3106AACB1}" type="datetimeFigureOut">
               <a:rPr lang="en-US" smtClean="0"/>
-              <a:t>3/13/2016</a:t>
+              <a:t>3/14/2016</a:t>
             </a:fld>
             <a:endParaRPr lang="en-US" dirty="0"/>
           </a:p>
@@ -1565,7 +1565,7 @@
           <a:p>
             <a:fld id="{4509A250-FF31-4206-8172-F9D3106AACB1}" type="datetimeFigureOut">
               <a:rPr lang="en-US" smtClean="0"/>
-              <a:t>3/13/2016</a:t>
+              <a:t>3/14/2016</a:t>
             </a:fld>
             <a:endParaRPr lang="en-US" dirty="0"/>
           </a:p>
@@ -1906,7 +1906,7 @@
           <a:p>
             <a:fld id="{4509A250-FF31-4206-8172-F9D3106AACB1}" type="datetimeFigureOut">
               <a:rPr lang="en-US" smtClean="0"/>
-              <a:t>3/13/2016</a:t>
+              <a:t>3/14/2016</a:t>
             </a:fld>
             <a:endParaRPr lang="en-US" dirty="0"/>
           </a:p>
@@ -2529,7 +2529,7 @@
           <a:p>
             <a:fld id="{4509A250-FF31-4206-8172-F9D3106AACB1}" type="datetimeFigureOut">
               <a:rPr lang="en-US" smtClean="0"/>
-              <a:t>3/13/2016</a:t>
+              <a:t>3/14/2016</a:t>
             </a:fld>
             <a:endParaRPr lang="en-US" dirty="0"/>
           </a:p>
@@ -3389,7 +3389,7 @@
           <a:p>
             <a:fld id="{4509A250-FF31-4206-8172-F9D3106AACB1}" type="datetimeFigureOut">
               <a:rPr lang="en-US" smtClean="0"/>
-              <a:t>3/13/2016</a:t>
+              <a:t>3/14/2016</a:t>
             </a:fld>
             <a:endParaRPr lang="en-US" dirty="0"/>
           </a:p>
@@ -3559,7 +3559,7 @@
           <a:p>
             <a:fld id="{4509A250-FF31-4206-8172-F9D3106AACB1}" type="datetimeFigureOut">
               <a:rPr lang="en-US" smtClean="0"/>
-              <a:t>3/13/2016</a:t>
+              <a:t>3/14/2016</a:t>
             </a:fld>
             <a:endParaRPr lang="en-US" dirty="0"/>
           </a:p>
@@ -3739,7 +3739,7 @@
           <a:p>
             <a:fld id="{4509A250-FF31-4206-8172-F9D3106AACB1}" type="datetimeFigureOut">
               <a:rPr lang="en-US" smtClean="0"/>
-              <a:t>3/13/2016</a:t>
+              <a:t>3/14/2016</a:t>
             </a:fld>
             <a:endParaRPr lang="en-US" dirty="0"/>
           </a:p>
@@ -3909,7 +3909,7 @@
           <a:p>
             <a:fld id="{4509A250-FF31-4206-8172-F9D3106AACB1}" type="datetimeFigureOut">
               <a:rPr lang="en-US" smtClean="0"/>
-              <a:t>3/13/2016</a:t>
+              <a:t>3/14/2016</a:t>
             </a:fld>
             <a:endParaRPr lang="en-US" dirty="0"/>
           </a:p>
@@ -4156,7 +4156,7 @@
           <a:p>
             <a:fld id="{9796027F-7875-4030-9381-8BD8C4F21935}" type="datetimeFigureOut">
               <a:rPr lang="en-US" smtClean="0"/>
-              <a:t>3/13/2016</a:t>
+              <a:t>3/14/2016</a:t>
             </a:fld>
             <a:endParaRPr lang="en-US" dirty="0"/>
           </a:p>
@@ -4448,7 +4448,7 @@
           <a:p>
             <a:fld id="{9796027F-7875-4030-9381-8BD8C4F21935}" type="datetimeFigureOut">
               <a:rPr lang="en-US" smtClean="0"/>
-              <a:t>3/13/2016</a:t>
+              <a:t>3/14/2016</a:t>
             </a:fld>
             <a:endParaRPr lang="en-US" dirty="0"/>
           </a:p>
@@ -4892,7 +4892,7 @@
           <a:p>
             <a:fld id="{9796027F-7875-4030-9381-8BD8C4F21935}" type="datetimeFigureOut">
               <a:rPr lang="en-US" smtClean="0"/>
-              <a:t>3/13/2016</a:t>
+              <a:t>3/14/2016</a:t>
             </a:fld>
             <a:endParaRPr lang="en-US" dirty="0"/>
           </a:p>
@@ -5010,7 +5010,7 @@
           <a:p>
             <a:fld id="{4509A250-FF31-4206-8172-F9D3106AACB1}" type="datetimeFigureOut">
               <a:rPr lang="en-US" smtClean="0"/>
-              <a:t>3/13/2016</a:t>
+              <a:t>3/14/2016</a:t>
             </a:fld>
             <a:endParaRPr lang="en-US" dirty="0"/>
           </a:p>
@@ -5105,7 +5105,7 @@
           <a:p>
             <a:fld id="{4509A250-FF31-4206-8172-F9D3106AACB1}" type="datetimeFigureOut">
               <a:rPr lang="en-US" smtClean="0"/>
-              <a:t>3/13/2016</a:t>
+              <a:t>3/14/2016</a:t>
             </a:fld>
             <a:endParaRPr lang="en-US" dirty="0"/>
           </a:p>
@@ -5384,7 +5384,7 @@
           <a:p>
             <a:fld id="{4509A250-FF31-4206-8172-F9D3106AACB1}" type="datetimeFigureOut">
               <a:rPr lang="en-US" smtClean="0"/>
-              <a:t>3/13/2016</a:t>
+              <a:t>3/14/2016</a:t>
             </a:fld>
             <a:endParaRPr lang="en-US" dirty="0"/>
           </a:p>
@@ -5659,7 +5659,7 @@
           <a:p>
             <a:fld id="{4509A250-FF31-4206-8172-F9D3106AACB1}" type="datetimeFigureOut">
               <a:rPr lang="en-US" smtClean="0"/>
-              <a:t>3/13/2016</a:t>
+              <a:t>3/14/2016</a:t>
             </a:fld>
             <a:endParaRPr lang="en-US" dirty="0"/>
           </a:p>
@@ -6088,7 +6088,7 @@
           <a:p>
             <a:fld id="{4AAD347D-5ACD-4C99-B74B-A9C85AD731AF}" type="datetimeFigureOut">
               <a:rPr lang="en-US" smtClean="0"/>
-              <a:t>3/13/2016</a:t>
+              <a:t>3/14/2016</a:t>
             </a:fld>
             <a:endParaRPr lang="en-US" dirty="0"/>
           </a:p>
@@ -8052,8 +8052,8 @@
         </p:nvSpPr>
         <p:spPr>
           <a:xfrm>
-            <a:off x="3723736" y="4937256"/>
-            <a:ext cx="2831760" cy="323054"/>
+            <a:off x="3947984" y="4937256"/>
+            <a:ext cx="2224211" cy="323054"/>
           </a:xfrm>
           <a:prstGeom prst="chevron">
             <a:avLst/>
@@ -8082,7 +8082,7 @@
             <a:pPr algn="ctr"/>
             <a:r>
               <a:rPr lang="en-US" sz="1400" dirty="0" smtClean="0"/>
-              <a:t>10Message[key][DH2]</a:t>
+              <a:t>10Message[key1]</a:t>
             </a:r>
             <a:endParaRPr lang="cs-CZ" sz="1400" dirty="0"/>
           </a:p>
@@ -8140,8 +8140,8 @@
         </p:nvSpPr>
         <p:spPr>
           <a:xfrm>
-            <a:off x="4006157" y="3583320"/>
-            <a:ext cx="2254599" cy="326640"/>
+            <a:off x="3723736" y="3583320"/>
+            <a:ext cx="2831760" cy="326640"/>
           </a:xfrm>
           <a:prstGeom prst="chevron">
             <a:avLst/>
@@ -8178,7 +8178,11 @@
             </a:r>
             <a:r>
               <a:rPr lang="en-US" sz="1400" dirty="0" smtClean="0"/>
-              <a:t>[key1]</a:t>
+              <a:t>[key1</a:t>
+            </a:r>
+            <a:r>
+              <a:rPr lang="en-US" sz="1400" dirty="0" smtClean="0"/>
+              <a:t>][DH]</a:t>
             </a:r>
             <a:endParaRPr lang="cs-CZ" sz="1400" dirty="0"/>
           </a:p>
@@ -8382,8 +8386,8 @@
         </p:nvSpPr>
         <p:spPr>
           <a:xfrm flipH="1">
-            <a:off x="3774963" y="5329347"/>
-            <a:ext cx="2627915" cy="266444"/>
+            <a:off x="3947984" y="5329347"/>
+            <a:ext cx="2224210" cy="266444"/>
           </a:xfrm>
           <a:prstGeom prst="chevron">
             <a:avLst/>
@@ -8502,8 +8506,8 @@
         </p:nvSpPr>
         <p:spPr>
           <a:xfrm>
-            <a:off x="4025746" y="5993106"/>
-            <a:ext cx="2235010" cy="294499"/>
+            <a:off x="3723736" y="5993106"/>
+            <a:ext cx="2831760" cy="294499"/>
           </a:xfrm>
           <a:prstGeom prst="chevron">
             <a:avLst/>
@@ -8544,7 +8548,11 @@
             </a:r>
             <a:r>
               <a:rPr lang="en-US" sz="1400" dirty="0" smtClean="0"/>
-              <a:t>[key2]</a:t>
+              <a:t>[key2</a:t>
+            </a:r>
+            <a:r>
+              <a:rPr lang="en-US" sz="1400" dirty="0" smtClean="0"/>
+              <a:t>][DH]</a:t>
             </a:r>
             <a:endParaRPr lang="cs-CZ" sz="1400" dirty="0"/>
           </a:p>

</xml_diff>